<commit_message>
update renv diagram and re-render site
</commit_message>
<xml_diff>
--- a/images/virtual-environments-diagrams.pptx
+++ b/images/virtual-environments-diagrams.pptx
@@ -199,7 +199,7 @@
           <a:p>
             <a:fld id="{D2B3588B-CC99-7344-ABD5-59A2FA694851}" type="datetimeFigureOut">
               <a:rPr lang="en-US" smtClean="0"/>
-              <a:t>8/21/22</a:t>
+              <a:t>10/24/23</a:t>
             </a:fld>
             <a:endParaRPr lang="en-US"/>
           </a:p>
@@ -597,7 +597,7 @@
           <a:p>
             <a:fld id="{3E88DE12-4FA2-6640-9CBD-BE42E19FC43B}" type="datetimeFigureOut">
               <a:rPr lang="en-US" smtClean="0"/>
-              <a:t>8/21/22</a:t>
+              <a:t>10/24/23</a:t>
             </a:fld>
             <a:endParaRPr lang="en-US"/>
           </a:p>
@@ -767,7 +767,7 @@
           <a:p>
             <a:fld id="{3E88DE12-4FA2-6640-9CBD-BE42E19FC43B}" type="datetimeFigureOut">
               <a:rPr lang="en-US" smtClean="0"/>
-              <a:t>8/21/22</a:t>
+              <a:t>10/24/23</a:t>
             </a:fld>
             <a:endParaRPr lang="en-US"/>
           </a:p>
@@ -947,7 +947,7 @@
           <a:p>
             <a:fld id="{3E88DE12-4FA2-6640-9CBD-BE42E19FC43B}" type="datetimeFigureOut">
               <a:rPr lang="en-US" smtClean="0"/>
-              <a:t>8/21/22</a:t>
+              <a:t>10/24/23</a:t>
             </a:fld>
             <a:endParaRPr lang="en-US"/>
           </a:p>
@@ -1117,7 +1117,7 @@
           <a:p>
             <a:fld id="{3E88DE12-4FA2-6640-9CBD-BE42E19FC43B}" type="datetimeFigureOut">
               <a:rPr lang="en-US" smtClean="0"/>
-              <a:t>8/21/22</a:t>
+              <a:t>10/24/23</a:t>
             </a:fld>
             <a:endParaRPr lang="en-US"/>
           </a:p>
@@ -1363,7 +1363,7 @@
           <a:p>
             <a:fld id="{3E88DE12-4FA2-6640-9CBD-BE42E19FC43B}" type="datetimeFigureOut">
               <a:rPr lang="en-US" smtClean="0"/>
-              <a:t>8/21/22</a:t>
+              <a:t>10/24/23</a:t>
             </a:fld>
             <a:endParaRPr lang="en-US"/>
           </a:p>
@@ -1595,7 +1595,7 @@
           <a:p>
             <a:fld id="{3E88DE12-4FA2-6640-9CBD-BE42E19FC43B}" type="datetimeFigureOut">
               <a:rPr lang="en-US" smtClean="0"/>
-              <a:t>8/21/22</a:t>
+              <a:t>10/24/23</a:t>
             </a:fld>
             <a:endParaRPr lang="en-US"/>
           </a:p>
@@ -1962,7 +1962,7 @@
           <a:p>
             <a:fld id="{3E88DE12-4FA2-6640-9CBD-BE42E19FC43B}" type="datetimeFigureOut">
               <a:rPr lang="en-US" smtClean="0"/>
-              <a:t>8/21/22</a:t>
+              <a:t>10/24/23</a:t>
             </a:fld>
             <a:endParaRPr lang="en-US"/>
           </a:p>
@@ -2080,7 +2080,7 @@
           <a:p>
             <a:fld id="{3E88DE12-4FA2-6640-9CBD-BE42E19FC43B}" type="datetimeFigureOut">
               <a:rPr lang="en-US" smtClean="0"/>
-              <a:t>8/21/22</a:t>
+              <a:t>10/24/23</a:t>
             </a:fld>
             <a:endParaRPr lang="en-US"/>
           </a:p>
@@ -2175,7 +2175,7 @@
           <a:p>
             <a:fld id="{3E88DE12-4FA2-6640-9CBD-BE42E19FC43B}" type="datetimeFigureOut">
               <a:rPr lang="en-US" smtClean="0"/>
-              <a:t>8/21/22</a:t>
+              <a:t>10/24/23</a:t>
             </a:fld>
             <a:endParaRPr lang="en-US"/>
           </a:p>
@@ -2452,7 +2452,7 @@
           <a:p>
             <a:fld id="{3E88DE12-4FA2-6640-9CBD-BE42E19FC43B}" type="datetimeFigureOut">
               <a:rPr lang="en-US" smtClean="0"/>
-              <a:t>8/21/22</a:t>
+              <a:t>10/24/23</a:t>
             </a:fld>
             <a:endParaRPr lang="en-US"/>
           </a:p>
@@ -2709,7 +2709,7 @@
           <a:p>
             <a:fld id="{3E88DE12-4FA2-6640-9CBD-BE42E19FC43B}" type="datetimeFigureOut">
               <a:rPr lang="en-US" smtClean="0"/>
-              <a:t>8/21/22</a:t>
+              <a:t>10/24/23</a:t>
             </a:fld>
             <a:endParaRPr lang="en-US"/>
           </a:p>
@@ -2922,7 +2922,7 @@
           <a:p>
             <a:fld id="{3E88DE12-4FA2-6640-9CBD-BE42E19FC43B}" type="datetimeFigureOut">
               <a:rPr lang="en-US" smtClean="0"/>
-              <a:t>8/21/22</a:t>
+              <a:t>10/24/23</a:t>
             </a:fld>
             <a:endParaRPr lang="en-US"/>
           </a:p>
@@ -6232,7 +6232,7 @@
           <p:spPr>
             <a:xfrm>
               <a:off x="9177040" y="3264057"/>
-              <a:ext cx="2520813" cy="1323439"/>
+              <a:ext cx="2520813" cy="1569660"/>
             </a:xfrm>
             <a:prstGeom prst="rect">
               <a:avLst/>
@@ -6285,6 +6285,22 @@
                   <a:cs typeface="Consolas" panose="020B0609020204030204" pitchFamily="49" charset="0"/>
                 </a:rPr>
                 <a:t>.Rprofile</a:t>
+              </a:r>
+            </a:p>
+            <a:p>
+              <a:pPr marL="285750" indent="-285750">
+                <a:buFont typeface="Arial" panose="020B0604020202020204" pitchFamily="34" charset="0"/>
+                <a:buChar char="•"/>
+              </a:pPr>
+              <a:r>
+                <a:rPr lang="en-US" sz="1600" dirty="0">
+                  <a:solidFill>
+                    <a:srgbClr val="C00000"/>
+                  </a:solidFill>
+                  <a:latin typeface="Consolas" panose="020B0609020204030204" pitchFamily="49" charset="0"/>
+                  <a:cs typeface="Consolas" panose="020B0609020204030204" pitchFamily="49" charset="0"/>
+                </a:rPr>
+                <a:t>renv/settings.json</a:t>
               </a:r>
             </a:p>
             <a:p>

</xml_diff>